<commit_message>
Implement FastAPI backend for AI-Based PowerPoint
</commit_message>
<xml_diff>
--- a/output/generated_presentation.pptx
+++ b/output/generated_presentation.pptx
@@ -3106,7 +3106,7 @@
           <a:lstStyle/>
           <a:p>
             <a:r>
-              <a:t>Sample Presentation</a:t>
+              <a:t>sample.txt</a:t>
             </a:r>
           </a:p>
         </p:txBody>
@@ -3162,7 +3162,7 @@
           <a:lstStyle/>
           <a:p>
             <a:r>
-              <a:t>Sample Presentation(part 1)</a:t>
+              <a:t>sample.txt(part 1)</a:t>
             </a:r>
           </a:p>
         </p:txBody>
@@ -3184,27 +3184,27 @@
           <a:p/>
           <a:p>
             <a:r>
-              <a:t>Point 1: Introduction to the topic.</a:t>
-            </a:r>
-          </a:p>
-          <a:p>
-            <a:r>
-              <a:t>Point 2: Key concepts and definitions.</a:t>
-            </a:r>
-          </a:p>
-          <a:p>
-            <a:r>
-              <a:t>Point 3: Detailed analysis of the subject matter.</a:t>
-            </a:r>
-          </a:p>
-          <a:p>
-            <a:r>
-              <a:t>Point 4: Case studies and real-world examples.</a:t>
-            </a:r>
-          </a:p>
-          <a:p>
-            <a:r>
-              <a:t>Point 5: Summary of findings and conclusions.</a:t>
+              <a:t>*   **Pervasiveness of Technology:** Integrated into all aspects of daily life (communication, work, learning).</a:t>
+            </a:r>
+          </a:p>
+          <a:p>
+            <a:r>
+              <a:t>*   **Rapid Innovation:** Evolution from simple machines to advanced AI transforms human potential and simplifies complex tasks.</a:t>
+            </a:r>
+          </a:p>
+          <a:p>
+            <a:r>
+              <a:t>*   **The Need for Responsibility:** Technological growth introduces critical challenges, including privacy concerns, misinformation, and digital addiction.</a:t>
+            </a:r>
+          </a:p>
+          <a:p>
+            <a:r>
+              <a:t>*   **Ethical Balance:** Societies must balance convenience with consciousness.</a:t>
+            </a:r>
+          </a:p>
+          <a:p>
+            <a:r>
+              <a:t>*   **Guiding Principle:** Technology must be used as an *enabler*, not a *controller*.</a:t>
             </a:r>
           </a:p>
         </p:txBody>
@@ -3243,7 +3243,7 @@
           <a:lstStyle/>
           <a:p>
             <a:r>
-              <a:t>Sample Presentation(part 2)</a:t>
+              <a:t>sample.txt(part 2)</a:t>
             </a:r>
           </a:p>
         </p:txBody>
@@ -3265,27 +3265,7 @@
           <a:p/>
           <a:p>
             <a:r>
-              <a:t>Point 6: Future directions and recommendations.</a:t>
-            </a:r>
-          </a:p>
-          <a:p>
-            <a:r>
-              <a:t>Point 7: Q&amp;A session and discussion points.</a:t>
-            </a:r>
-          </a:p>
-          <a:p>
-            <a:r>
-              <a:t>Point 8: Additional resources and references.</a:t>
-            </a:r>
-          </a:p>
-          <a:p>
-            <a:r>
-              <a:t>Point 9: Acknowledgments and credits.</a:t>
-            </a:r>
-          </a:p>
-          <a:p>
-            <a:r>
-              <a:t>Point 10: Closing remarks and final thoughts.</a:t>
+              <a:t>*   **Future Focus:** Innovation must be guided by empathy, ethics, and purpose to create a kinder and more sustainable world.</a:t>
             </a:r>
           </a:p>
         </p:txBody>

</xml_diff>